<commit_message>
Fix some typo's and other small errors
</commit_message>
<xml_diff>
--- a/slides/I2C_mbed_memory_slave.pptx
+++ b/slides/I2C_mbed_memory_slave.pptx
@@ -25,7 +25,7 @@
     <p:sldId id="282" r:id="rId19"/>
   </p:sldIdLst>
   <p:sldSz cx="9144000" cy="6858000" type="screen4x3"/>
-  <p:notesSz cx="6858000" cy="9144000"/>
+  <p:notesSz cx="7099300" cy="10234613"/>
   <p:defaultTextStyle>
     <a:defPPr>
       <a:defRPr lang="en-US"/>
@@ -330,7 +330,7 @@
           <a:p>
             <a:fld id="{9E1E4C47-8EB7-495D-938E-E2CDA69D1F3B}" type="datetimeFigureOut">
               <a:rPr lang="en-US" smtClean="0"/>
-              <a:t>10/16/2014</a:t>
+              <a:t>10/17/2014</a:t>
             </a:fld>
             <a:endParaRPr lang="en-US"/>
           </a:p>
@@ -469,7 +469,7 @@
           <a:p>
             <a:fld id="{9E1E4C47-8EB7-495D-938E-E2CDA69D1F3B}" type="datetimeFigureOut">
               <a:rPr lang="en-US" smtClean="0"/>
-              <a:t>10/16/2014</a:t>
+              <a:t>10/17/2014</a:t>
             </a:fld>
             <a:endParaRPr lang="en-US"/>
           </a:p>
@@ -585,7 +585,7 @@
           <a:p>
             <a:fld id="{9E1E4C47-8EB7-495D-938E-E2CDA69D1F3B}" type="datetimeFigureOut">
               <a:rPr lang="en-US" smtClean="0"/>
-              <a:t>10/16/2014</a:t>
+              <a:t>10/17/2014</a:t>
             </a:fld>
             <a:endParaRPr lang="en-US"/>
           </a:p>
@@ -883,7 +883,7 @@
           <a:p>
             <a:fld id="{9E1E4C47-8EB7-495D-938E-E2CDA69D1F3B}" type="datetimeFigureOut">
               <a:rPr lang="en-US" smtClean="0"/>
-              <a:t>10/16/2014</a:t>
+              <a:t>10/17/2014</a:t>
             </a:fld>
             <a:endParaRPr lang="en-US"/>
           </a:p>
@@ -1161,7 +1161,7 @@
           <a:p>
             <a:fld id="{9E1E4C47-8EB7-495D-938E-E2CDA69D1F3B}" type="datetimeFigureOut">
               <a:rPr lang="en-US" smtClean="0"/>
-              <a:t>10/16/2014</a:t>
+              <a:t>10/17/2014</a:t>
             </a:fld>
             <a:endParaRPr lang="en-US"/>
           </a:p>
@@ -1352,7 +1352,7 @@
           <a:p>
             <a:fld id="{9E1E4C47-8EB7-495D-938E-E2CDA69D1F3B}" type="datetimeFigureOut">
               <a:rPr lang="en-US" smtClean="0"/>
-              <a:t>10/16/2014</a:t>
+              <a:t>10/17/2014</a:t>
             </a:fld>
             <a:endParaRPr lang="en-US"/>
           </a:p>
@@ -1553,7 +1553,7 @@
           <a:p>
             <a:fld id="{9E1E4C47-8EB7-495D-938E-E2CDA69D1F3B}" type="datetimeFigureOut">
               <a:rPr lang="en-US" smtClean="0"/>
-              <a:t>10/16/2014</a:t>
+              <a:t>10/17/2014</a:t>
             </a:fld>
             <a:endParaRPr lang="en-US"/>
           </a:p>
@@ -1816,7 +1816,7 @@
           <a:p>
             <a:fld id="{9E1E4C47-8EB7-495D-938E-E2CDA69D1F3B}" type="datetimeFigureOut">
               <a:rPr lang="en-US" smtClean="0"/>
-              <a:t>10/16/2014</a:t>
+              <a:t>10/17/2014</a:t>
             </a:fld>
             <a:endParaRPr lang="en-US"/>
           </a:p>
@@ -2007,7 +2007,7 @@
           <a:p>
             <a:fld id="{9E1E4C47-8EB7-495D-938E-E2CDA69D1F3B}" type="datetimeFigureOut">
               <a:rPr lang="en-US" smtClean="0"/>
-              <a:t>10/16/2014</a:t>
+              <a:t>10/17/2014</a:t>
             </a:fld>
             <a:endParaRPr lang="en-US"/>
           </a:p>
@@ -2203,7 +2203,7 @@
           <a:p>
             <a:fld id="{9E1E4C47-8EB7-495D-938E-E2CDA69D1F3B}" type="datetimeFigureOut">
               <a:rPr lang="en-US" smtClean="0"/>
-              <a:t>10/16/2014</a:t>
+              <a:t>10/17/2014</a:t>
             </a:fld>
             <a:endParaRPr lang="en-US"/>
           </a:p>
@@ -2402,7 +2402,7 @@
           <a:p>
             <a:fld id="{9E1E4C47-8EB7-495D-938E-E2CDA69D1F3B}" type="datetimeFigureOut">
               <a:rPr lang="en-US" smtClean="0"/>
-              <a:t>10/16/2014</a:t>
+              <a:t>10/17/2014</a:t>
             </a:fld>
             <a:endParaRPr lang="en-US"/>
           </a:p>
@@ -2593,7 +2593,7 @@
           <a:p>
             <a:fld id="{9E1E4C47-8EB7-495D-938E-E2CDA69D1F3B}" type="datetimeFigureOut">
               <a:rPr lang="en-US" smtClean="0"/>
-              <a:t>10/16/2014</a:t>
+              <a:t>10/17/2014</a:t>
             </a:fld>
             <a:endParaRPr lang="en-US"/>
           </a:p>
@@ -2860,7 +2860,7 @@
           <a:p>
             <a:fld id="{9E1E4C47-8EB7-495D-938E-E2CDA69D1F3B}" type="datetimeFigureOut">
               <a:rPr lang="en-US" smtClean="0"/>
-              <a:t>10/16/2014</a:t>
+              <a:t>10/17/2014</a:t>
             </a:fld>
             <a:endParaRPr lang="en-US"/>
           </a:p>
@@ -3169,7 +3169,7 @@
           <a:p>
             <a:fld id="{9E1E4C47-8EB7-495D-938E-E2CDA69D1F3B}" type="datetimeFigureOut">
               <a:rPr lang="en-US" smtClean="0"/>
-              <a:t>10/16/2014</a:t>
+              <a:t>10/17/2014</a:t>
             </a:fld>
             <a:endParaRPr lang="en-US"/>
           </a:p>
@@ -3612,7 +3612,7 @@
           <a:p>
             <a:fld id="{9E1E4C47-8EB7-495D-938E-E2CDA69D1F3B}" type="datetimeFigureOut">
               <a:rPr lang="en-US" smtClean="0"/>
-              <a:t>10/16/2014</a:t>
+              <a:t>10/17/2014</a:t>
             </a:fld>
             <a:endParaRPr lang="en-US"/>
           </a:p>
@@ -3869,7 +3869,7 @@
           <a:p>
             <a:fld id="{9E1E4C47-8EB7-495D-938E-E2CDA69D1F3B}" type="datetimeFigureOut">
               <a:rPr lang="en-US" smtClean="0"/>
-              <a:t>10/16/2014</a:t>
+              <a:t>10/17/2014</a:t>
             </a:fld>
             <a:endParaRPr lang="en-US"/>
           </a:p>
@@ -10463,14 +10463,25 @@
           <a:p>
             <a:r>
               <a:rPr lang="en-US" dirty="0" smtClean="0"/>
-              <a:t>Find a bug in the slave and earn an extra point </a:t>
-            </a:r>
-            <a:r>
-              <a:rPr lang="en-US" dirty="0" smtClean="0">
+              <a:t>Find a bug in the slave and earn an </a:t>
+            </a:r>
+            <a:r>
+              <a:rPr lang="en-US" smtClean="0"/>
+              <a:t>extra </a:t>
+            </a:r>
+            <a:r>
+              <a:rPr lang="en-US" smtClean="0"/>
+              <a:t>credit </a:t>
+            </a:r>
+            <a:r>
+              <a:rPr lang="en-US" smtClean="0">
                 <a:sym typeface="Wingdings" panose="05000000000000000000" pitchFamily="2" charset="2"/>
               </a:rPr>
               <a:t></a:t>
             </a:r>
+            <a:endParaRPr lang="en-US" dirty="0" smtClean="0">
+              <a:sym typeface="Wingdings" panose="05000000000000000000" pitchFamily="2" charset="2"/>
+            </a:endParaRPr>
           </a:p>
           <a:p>
             <a:endParaRPr lang="en-US" dirty="0">

</xml_diff>